<commit_message>
Handling partailly vanishing saddles
Signed-off-by: AnkaChan <AnkaChan@users.noreply.github.com>
</commit_message>
<xml_diff>
--- a/S05_ReverseEngineeringOfMergeTree/Slides/FittingEnergy.pptx
+++ b/S05_ReverseEngineeringOfMergeTree/Slides/FittingEnergy.pptx
@@ -264,7 +264,7 @@
           <a:p>
             <a:fld id="{92520A82-A658-4F65-AA1D-2523927130D8}" type="datetimeFigureOut">
               <a:rPr lang="en-US" smtClean="0"/>
-              <a:t>2/23/2023</a:t>
+              <a:t>4/7/2023</a:t>
             </a:fld>
             <a:endParaRPr lang="en-US"/>
           </a:p>
@@ -464,7 +464,7 @@
           <a:p>
             <a:fld id="{92520A82-A658-4F65-AA1D-2523927130D8}" type="datetimeFigureOut">
               <a:rPr lang="en-US" smtClean="0"/>
-              <a:t>2/23/2023</a:t>
+              <a:t>4/7/2023</a:t>
             </a:fld>
             <a:endParaRPr lang="en-US"/>
           </a:p>
@@ -674,7 +674,7 @@
           <a:p>
             <a:fld id="{92520A82-A658-4F65-AA1D-2523927130D8}" type="datetimeFigureOut">
               <a:rPr lang="en-US" smtClean="0"/>
-              <a:t>2/23/2023</a:t>
+              <a:t>4/7/2023</a:t>
             </a:fld>
             <a:endParaRPr lang="en-US"/>
           </a:p>
@@ -874,7 +874,7 @@
           <a:p>
             <a:fld id="{92520A82-A658-4F65-AA1D-2523927130D8}" type="datetimeFigureOut">
               <a:rPr lang="en-US" smtClean="0"/>
-              <a:t>2/23/2023</a:t>
+              <a:t>4/7/2023</a:t>
             </a:fld>
             <a:endParaRPr lang="en-US"/>
           </a:p>
@@ -1150,7 +1150,7 @@
           <a:p>
             <a:fld id="{92520A82-A658-4F65-AA1D-2523927130D8}" type="datetimeFigureOut">
               <a:rPr lang="en-US" smtClean="0"/>
-              <a:t>2/23/2023</a:t>
+              <a:t>4/7/2023</a:t>
             </a:fld>
             <a:endParaRPr lang="en-US"/>
           </a:p>
@@ -1418,7 +1418,7 @@
           <a:p>
             <a:fld id="{92520A82-A658-4F65-AA1D-2523927130D8}" type="datetimeFigureOut">
               <a:rPr lang="en-US" smtClean="0"/>
-              <a:t>2/23/2023</a:t>
+              <a:t>4/7/2023</a:t>
             </a:fld>
             <a:endParaRPr lang="en-US"/>
           </a:p>
@@ -1833,7 +1833,7 @@
           <a:p>
             <a:fld id="{92520A82-A658-4F65-AA1D-2523927130D8}" type="datetimeFigureOut">
               <a:rPr lang="en-US" smtClean="0"/>
-              <a:t>2/23/2023</a:t>
+              <a:t>4/7/2023</a:t>
             </a:fld>
             <a:endParaRPr lang="en-US"/>
           </a:p>
@@ -1975,7 +1975,7 @@
           <a:p>
             <a:fld id="{92520A82-A658-4F65-AA1D-2523927130D8}" type="datetimeFigureOut">
               <a:rPr lang="en-US" smtClean="0"/>
-              <a:t>2/23/2023</a:t>
+              <a:t>4/7/2023</a:t>
             </a:fld>
             <a:endParaRPr lang="en-US"/>
           </a:p>
@@ -2088,7 +2088,7 @@
           <a:p>
             <a:fld id="{92520A82-A658-4F65-AA1D-2523927130D8}" type="datetimeFigureOut">
               <a:rPr lang="en-US" smtClean="0"/>
-              <a:t>2/23/2023</a:t>
+              <a:t>4/7/2023</a:t>
             </a:fld>
             <a:endParaRPr lang="en-US"/>
           </a:p>
@@ -2401,7 +2401,7 @@
           <a:p>
             <a:fld id="{92520A82-A658-4F65-AA1D-2523927130D8}" type="datetimeFigureOut">
               <a:rPr lang="en-US" smtClean="0"/>
-              <a:t>2/23/2023</a:t>
+              <a:t>4/7/2023</a:t>
             </a:fld>
             <a:endParaRPr lang="en-US"/>
           </a:p>
@@ -2690,7 +2690,7 @@
           <a:p>
             <a:fld id="{92520A82-A658-4F65-AA1D-2523927130D8}" type="datetimeFigureOut">
               <a:rPr lang="en-US" smtClean="0"/>
-              <a:t>2/23/2023</a:t>
+              <a:t>4/7/2023</a:t>
             </a:fld>
             <a:endParaRPr lang="en-US"/>
           </a:p>
@@ -2933,7 +2933,7 @@
           <a:p>
             <a:fld id="{92520A82-A658-4F65-AA1D-2523927130D8}" type="datetimeFigureOut">
               <a:rPr lang="en-US" smtClean="0"/>
-              <a:t>2/23/2023</a:t>
+              <a:t>4/7/2023</a:t>
             </a:fld>
             <a:endParaRPr lang="en-US"/>
           </a:p>
@@ -3682,45 +3682,6 @@
       </p:sp>
       <p:sp>
         <p:nvSpPr>
-          <p:cNvPr id="11" name="文本框 10">
-            <a:extLst>
-              <a:ext uri="{FF2B5EF4-FFF2-40B4-BE49-F238E27FC236}">
-                <a16:creationId xmlns:a16="http://schemas.microsoft.com/office/drawing/2014/main" id="{1AC78F48-87C2-7AD6-D684-DA4A32E5161A}"/>
-              </a:ext>
-            </a:extLst>
-          </p:cNvPr>
-          <p:cNvSpPr txBox="1"/>
-          <p:nvPr/>
-        </p:nvSpPr>
-        <p:spPr>
-          <a:xfrm>
-            <a:off x="7886224" y="3749052"/>
-            <a:ext cx="1228221" cy="369332"/>
-          </a:xfrm>
-          <a:prstGeom prst="rect">
-            <a:avLst/>
-          </a:prstGeom>
-          <a:noFill/>
-        </p:spPr>
-        <p:txBody>
-          <a:bodyPr wrap="none" rtlCol="0">
-            <a:spAutoFit/>
-          </a:bodyPr>
-          <a:lstStyle/>
-          <a:p>
-            <a:r>
-              <a:rPr lang="en-US">
-                <a:solidFill>
-                  <a:srgbClr val="FF0000"/>
-                </a:solidFill>
-              </a:rPr>
-              <a:t>(Not Done)</a:t>
-            </a:r>
-          </a:p>
-        </p:txBody>
-      </p:sp>
-      <p:sp>
-        <p:nvSpPr>
           <p:cNvPr id="12" name="文本框 11">
             <a:extLst>
               <a:ext uri="{FF2B5EF4-FFF2-40B4-BE49-F238E27FC236}">
@@ -4115,7 +4076,46 @@
         </p:nvSpPr>
         <p:spPr>
           <a:xfrm>
-            <a:off x="10155766" y="2683775"/>
+            <a:off x="10270448" y="2422225"/>
+            <a:ext cx="1582677" cy="369332"/>
+          </a:xfrm>
+          <a:prstGeom prst="rect">
+            <a:avLst/>
+          </a:prstGeom>
+          <a:noFill/>
+        </p:spPr>
+        <p:txBody>
+          <a:bodyPr wrap="none" rtlCol="0">
+            <a:spAutoFit/>
+          </a:bodyPr>
+          <a:lstStyle/>
+          <a:p>
+            <a:r>
+              <a:rPr lang="en-US">
+                <a:solidFill>
+                  <a:srgbClr val="00B050"/>
+                </a:solidFill>
+              </a:rPr>
+              <a:t>(Done/Kind of)</a:t>
+            </a:r>
+          </a:p>
+        </p:txBody>
+      </p:sp>
+      <p:sp>
+        <p:nvSpPr>
+          <p:cNvPr id="2" name="文本框 1">
+            <a:extLst>
+              <a:ext uri="{FF2B5EF4-FFF2-40B4-BE49-F238E27FC236}">
+                <a16:creationId xmlns:a16="http://schemas.microsoft.com/office/drawing/2014/main" id="{CB5E6BAB-E9F5-4D02-65E4-836A3EA8A283}"/>
+              </a:ext>
+            </a:extLst>
+          </p:cNvPr>
+          <p:cNvSpPr txBox="1"/>
+          <p:nvPr/>
+        </p:nvSpPr>
+        <p:spPr>
+          <a:xfrm>
+            <a:off x="7672863" y="3244334"/>
             <a:ext cx="827471" cy="369332"/>
           </a:xfrm>
           <a:prstGeom prst="rect">
@@ -4142,10 +4142,10 @@
       </p:sp>
       <p:sp>
         <p:nvSpPr>
-          <p:cNvPr id="47" name="文本框 46">
+          <p:cNvPr id="3" name="文本框 2">
             <a:extLst>
               <a:ext uri="{FF2B5EF4-FFF2-40B4-BE49-F238E27FC236}">
-                <a16:creationId xmlns:a16="http://schemas.microsoft.com/office/drawing/2014/main" id="{B7F6E92B-59E2-6C66-5E36-D78117A56402}"/>
+                <a16:creationId xmlns:a16="http://schemas.microsoft.com/office/drawing/2014/main" id="{DD5D01B4-EAEF-79CA-51F3-F90EA0B9C70A}"/>
               </a:ext>
             </a:extLst>
           </p:cNvPr>
@@ -4154,8 +4154,8 @@
         </p:nvSpPr>
         <p:spPr>
           <a:xfrm>
-            <a:off x="7886223" y="3234462"/>
-            <a:ext cx="1228221" cy="369332"/>
+            <a:off x="8086598" y="3719516"/>
+            <a:ext cx="827471" cy="369332"/>
           </a:xfrm>
           <a:prstGeom prst="rect">
             <a:avLst/>
@@ -4171,10 +4171,10 @@
             <a:r>
               <a:rPr lang="en-US">
                 <a:solidFill>
-                  <a:srgbClr val="FF0000"/>
+                  <a:srgbClr val="00B050"/>
                 </a:solidFill>
               </a:rPr>
-              <a:t>(Not Done)</a:t>
+              <a:t>(Done)</a:t>
             </a:r>
           </a:p>
         </p:txBody>

</xml_diff>